<commit_message>
Cambios menores a presentación
</commit_message>
<xml_diff>
--- a/src/Experimentos/Experimento segunda diferencia finita/Presentación del experimento de diferencia finita de segundo orden.pptx
+++ b/src/Experimentos/Experimento segunda diferencia finita/Presentación del experimento de diferencia finita de segundo orden.pptx
@@ -5,7 +5,7 @@
     <p:sldMasterId id="2147483659" r:id="rId1"/>
   </p:sldMasterIdLst>
   <p:notesMasterIdLst>
-    <p:notesMasterId r:id="rId17"/>
+    <p:notesMasterId r:id="rId18"/>
   </p:notesMasterIdLst>
   <p:sldIdLst>
     <p:sldId id="258" r:id="rId2"/>
@@ -15,14 +15,15 @@
     <p:sldId id="275" r:id="rId6"/>
     <p:sldId id="260" r:id="rId7"/>
     <p:sldId id="261" r:id="rId8"/>
-    <p:sldId id="262" r:id="rId9"/>
-    <p:sldId id="267" r:id="rId10"/>
-    <p:sldId id="268" r:id="rId11"/>
-    <p:sldId id="276" r:id="rId12"/>
-    <p:sldId id="269" r:id="rId13"/>
-    <p:sldId id="270" r:id="rId14"/>
-    <p:sldId id="271" r:id="rId15"/>
-    <p:sldId id="272" r:id="rId16"/>
+    <p:sldId id="277" r:id="rId9"/>
+    <p:sldId id="262" r:id="rId10"/>
+    <p:sldId id="267" r:id="rId11"/>
+    <p:sldId id="268" r:id="rId12"/>
+    <p:sldId id="276" r:id="rId13"/>
+    <p:sldId id="269" r:id="rId14"/>
+    <p:sldId id="270" r:id="rId15"/>
+    <p:sldId id="271" r:id="rId16"/>
+    <p:sldId id="272" r:id="rId17"/>
   </p:sldIdLst>
   <p:sldSz cx="9144000" cy="5143500" type="screen16x9"/>
   <p:notesSz cx="6858000" cy="9144000"/>
@@ -824,7 +825,7 @@
   <p:cSld>
     <p:spTree>
       <p:nvGrpSpPr>
-        <p:cNvPr id="1" name="Shape 124"/>
+        <p:cNvPr id="1" name="Shape 118"/>
         <p:cNvGrpSpPr/>
         <p:nvPr/>
       </p:nvGrpSpPr>
@@ -838,7 +839,7 @@
       </p:grpSpPr>
       <p:sp>
         <p:nvSpPr>
-          <p:cNvPr id="125" name="Google Shape;125;g15d8b2716ee_0_36:notes"/>
+          <p:cNvPr id="119" name="Google Shape;119;g15d8b2716ee_0_57:notes"/>
           <p:cNvSpPr>
             <a:spLocks noGrp="1" noRot="1" noChangeAspect="1"/>
           </p:cNvSpPr>
@@ -879,7 +880,7 @@
       </p:sp>
       <p:sp>
         <p:nvSpPr>
-          <p:cNvPr id="126" name="Google Shape;126;g15d8b2716ee_0_36:notes"/>
+          <p:cNvPr id="120" name="Google Shape;120;g15d8b2716ee_0_57:notes"/>
           <p:cNvSpPr txBox="1">
             <a:spLocks noGrp="1"/>
           </p:cNvSpPr>
@@ -1020,6 +1021,110 @@
         </p:txBody>
       </p:sp>
     </p:spTree>
+  </p:cSld>
+  <p:clrMapOvr>
+    <a:masterClrMapping/>
+  </p:clrMapOvr>
+</p:notes>
+</file>
+
+<file path=ppt/notesSlides/notesSlide12.xml><?xml version="1.0" encoding="utf-8"?>
+<p:notes xmlns:a="http://schemas.openxmlformats.org/drawingml/2006/main" xmlns:r="http://schemas.openxmlformats.org/officeDocument/2006/relationships" xmlns:p="http://schemas.openxmlformats.org/presentationml/2006/main" showMasterSp="0" showMasterPhAnim="0">
+  <p:cSld>
+    <p:spTree>
+      <p:nvGrpSpPr>
+        <p:cNvPr id="1" name="Shape 124"/>
+        <p:cNvGrpSpPr/>
+        <p:nvPr/>
+      </p:nvGrpSpPr>
+      <p:grpSpPr>
+        <a:xfrm>
+          <a:off x="0" y="0"/>
+          <a:ext cx="0" cy="0"/>
+          <a:chOff x="0" y="0"/>
+          <a:chExt cx="0" cy="0"/>
+        </a:xfrm>
+      </p:grpSpPr>
+      <p:sp>
+        <p:nvSpPr>
+          <p:cNvPr id="125" name="Google Shape;125;g15d8b2716ee_0_36:notes"/>
+          <p:cNvSpPr>
+            <a:spLocks noGrp="1" noRot="1" noChangeAspect="1"/>
+          </p:cNvSpPr>
+          <p:nvPr>
+            <p:ph type="sldImg" idx="2"/>
+          </p:nvPr>
+        </p:nvSpPr>
+        <p:spPr>
+          <a:xfrm>
+            <a:off x="381000" y="685800"/>
+            <a:ext cx="6096000" cy="3429000"/>
+          </a:xfrm>
+          <a:custGeom>
+            <a:avLst/>
+            <a:gdLst/>
+            <a:ahLst/>
+            <a:cxnLst/>
+            <a:rect l="l" t="t" r="r" b="b"/>
+            <a:pathLst>
+              <a:path w="120000" h="120000" extrusionOk="0">
+                <a:moveTo>
+                  <a:pt x="0" y="0"/>
+                </a:moveTo>
+                <a:lnTo>
+                  <a:pt x="120000" y="0"/>
+                </a:lnTo>
+                <a:lnTo>
+                  <a:pt x="120000" y="120000"/>
+                </a:lnTo>
+                <a:lnTo>
+                  <a:pt x="0" y="120000"/>
+                </a:lnTo>
+                <a:close/>
+              </a:path>
+            </a:pathLst>
+          </a:custGeom>
+        </p:spPr>
+      </p:sp>
+      <p:sp>
+        <p:nvSpPr>
+          <p:cNvPr id="126" name="Google Shape;126;g15d8b2716ee_0_36:notes"/>
+          <p:cNvSpPr txBox="1">
+            <a:spLocks noGrp="1"/>
+          </p:cNvSpPr>
+          <p:nvPr>
+            <p:ph type="body" idx="1"/>
+          </p:nvPr>
+        </p:nvSpPr>
+        <p:spPr>
+          <a:xfrm>
+            <a:off x="685800" y="4343400"/>
+            <a:ext cx="5486400" cy="4114800"/>
+          </a:xfrm>
+          <a:prstGeom prst="rect">
+            <a:avLst/>
+          </a:prstGeom>
+        </p:spPr>
+        <p:txBody>
+          <a:bodyPr spcFirstLastPara="1" wrap="square" lIns="91425" tIns="91425" rIns="91425" bIns="91425" anchor="t" anchorCtr="0">
+            <a:noAutofit/>
+          </a:bodyPr>
+          <a:lstStyle/>
+          <a:p>
+            <a:pPr marL="0" lvl="0" indent="0" algn="l" rtl="0">
+              <a:spcBef>
+                <a:spcPts val="0"/>
+              </a:spcBef>
+              <a:spcAft>
+                <a:spcPts val="0"/>
+              </a:spcAft>
+              <a:buNone/>
+            </a:pPr>
+            <a:endParaRPr/>
+          </a:p>
+        </p:txBody>
+      </p:sp>
+    </p:spTree>
     <p:extLst>
       <p:ext uri="{BB962C8B-B14F-4D97-AF65-F5344CB8AC3E}">
         <p14:creationId xmlns:p14="http://schemas.microsoft.com/office/powerpoint/2010/main" val="2157325644"/>
@@ -1032,7 +1137,7 @@
 </p:notes>
 </file>
 
-<file path=ppt/notesSlides/notesSlide12.xml><?xml version="1.0" encoding="utf-8"?>
+<file path=ppt/notesSlides/notesSlide13.xml><?xml version="1.0" encoding="utf-8"?>
 <p:notes xmlns:a="http://schemas.openxmlformats.org/drawingml/2006/main" xmlns:r="http://schemas.openxmlformats.org/officeDocument/2006/relationships" xmlns:p="http://schemas.openxmlformats.org/presentationml/2006/main" showMasterSp="0" showMasterPhAnim="0">
   <p:cSld>
     <p:spTree>
@@ -1136,7 +1241,7 @@
 </p:notes>
 </file>
 
-<file path=ppt/notesSlides/notesSlide13.xml><?xml version="1.0" encoding="utf-8"?>
+<file path=ppt/notesSlides/notesSlide14.xml><?xml version="1.0" encoding="utf-8"?>
 <p:notes xmlns:a="http://schemas.openxmlformats.org/drawingml/2006/main" xmlns:r="http://schemas.openxmlformats.org/officeDocument/2006/relationships" xmlns:p="http://schemas.openxmlformats.org/presentationml/2006/main" showMasterSp="0" showMasterPhAnim="0">
   <p:cSld>
     <p:spTree>
@@ -1240,7 +1345,7 @@
 </p:notes>
 </file>
 
-<file path=ppt/notesSlides/notesSlide14.xml><?xml version="1.0" encoding="utf-8"?>
+<file path=ppt/notesSlides/notesSlide15.xml><?xml version="1.0" encoding="utf-8"?>
 <p:notes xmlns:a="http://schemas.openxmlformats.org/drawingml/2006/main" xmlns:r="http://schemas.openxmlformats.org/officeDocument/2006/relationships" xmlns:p="http://schemas.openxmlformats.org/presentationml/2006/main" showMasterSp="0" showMasterPhAnim="0">
   <p:cSld>
     <p:spTree>
@@ -1344,7 +1449,7 @@
 </p:notes>
 </file>
 
-<file path=ppt/notesSlides/notesSlide15.xml><?xml version="1.0" encoding="utf-8"?>
+<file path=ppt/notesSlides/notesSlide16.xml><?xml version="1.0" encoding="utf-8"?>
 <p:notes xmlns:a="http://schemas.openxmlformats.org/drawingml/2006/main" xmlns:r="http://schemas.openxmlformats.org/officeDocument/2006/relationships" xmlns:p="http://schemas.openxmlformats.org/presentationml/2006/main" showMasterSp="0" showMasterPhAnim="0">
   <p:cSld>
     <p:spTree>
@@ -2092,6 +2197,115 @@
   <p:cSld>
     <p:spTree>
       <p:nvGrpSpPr>
+        <p:cNvPr id="1" name="Shape 82"/>
+        <p:cNvGrpSpPr/>
+        <p:nvPr/>
+      </p:nvGrpSpPr>
+      <p:grpSpPr>
+        <a:xfrm>
+          <a:off x="0" y="0"/>
+          <a:ext cx="0" cy="0"/>
+          <a:chOff x="0" y="0"/>
+          <a:chExt cx="0" cy="0"/>
+        </a:xfrm>
+      </p:grpSpPr>
+      <p:sp>
+        <p:nvSpPr>
+          <p:cNvPr id="83" name="Google Shape;83;g15d8b2716ee_0_31:notes"/>
+          <p:cNvSpPr>
+            <a:spLocks noGrp="1" noRot="1" noChangeAspect="1"/>
+          </p:cNvSpPr>
+          <p:nvPr>
+            <p:ph type="sldImg" idx="2"/>
+          </p:nvPr>
+        </p:nvSpPr>
+        <p:spPr>
+          <a:xfrm>
+            <a:off x="381000" y="685800"/>
+            <a:ext cx="6096000" cy="3429000"/>
+          </a:xfrm>
+          <a:custGeom>
+            <a:avLst/>
+            <a:gdLst/>
+            <a:ahLst/>
+            <a:cxnLst/>
+            <a:rect l="l" t="t" r="r" b="b"/>
+            <a:pathLst>
+              <a:path w="120000" h="120000" extrusionOk="0">
+                <a:moveTo>
+                  <a:pt x="0" y="0"/>
+                </a:moveTo>
+                <a:lnTo>
+                  <a:pt x="120000" y="0"/>
+                </a:lnTo>
+                <a:lnTo>
+                  <a:pt x="120000" y="120000"/>
+                </a:lnTo>
+                <a:lnTo>
+                  <a:pt x="0" y="120000"/>
+                </a:lnTo>
+                <a:close/>
+              </a:path>
+            </a:pathLst>
+          </a:custGeom>
+        </p:spPr>
+      </p:sp>
+      <p:sp>
+        <p:nvSpPr>
+          <p:cNvPr id="84" name="Google Shape;84;g15d8b2716ee_0_31:notes"/>
+          <p:cNvSpPr txBox="1">
+            <a:spLocks noGrp="1"/>
+          </p:cNvSpPr>
+          <p:nvPr>
+            <p:ph type="body" idx="1"/>
+          </p:nvPr>
+        </p:nvSpPr>
+        <p:spPr>
+          <a:xfrm>
+            <a:off x="685800" y="4343400"/>
+            <a:ext cx="5486400" cy="4114800"/>
+          </a:xfrm>
+          <a:prstGeom prst="rect">
+            <a:avLst/>
+          </a:prstGeom>
+        </p:spPr>
+        <p:txBody>
+          <a:bodyPr spcFirstLastPara="1" wrap="square" lIns="91425" tIns="91425" rIns="91425" bIns="91425" anchor="t" anchorCtr="0">
+            <a:noAutofit/>
+          </a:bodyPr>
+          <a:lstStyle/>
+          <a:p>
+            <a:pPr marL="0" lvl="0" indent="0" algn="l" rtl="0">
+              <a:spcBef>
+                <a:spcPts val="0"/>
+              </a:spcBef>
+              <a:spcAft>
+                <a:spcPts val="0"/>
+              </a:spcAft>
+              <a:buNone/>
+            </a:pPr>
+            <a:endParaRPr/>
+          </a:p>
+        </p:txBody>
+      </p:sp>
+    </p:spTree>
+    <p:extLst>
+      <p:ext uri="{BB962C8B-B14F-4D97-AF65-F5344CB8AC3E}">
+        <p14:creationId xmlns:p14="http://schemas.microsoft.com/office/powerpoint/2010/main" val="3723522390"/>
+      </p:ext>
+    </p:extLst>
+  </p:cSld>
+  <p:clrMapOvr>
+    <a:masterClrMapping/>
+  </p:clrMapOvr>
+</p:notes>
+</file>
+
+<file path=ppt/notesSlides/notesSlide9.xml><?xml version="1.0" encoding="utf-8"?>
+<p:notes xmlns:a="http://schemas.openxmlformats.org/drawingml/2006/main" xmlns:r="http://schemas.openxmlformats.org/officeDocument/2006/relationships" xmlns:p="http://schemas.openxmlformats.org/presentationml/2006/main" showMasterSp="0" showMasterPhAnim="0">
+  <p:cSld>
+    <p:spTree>
+      <p:nvGrpSpPr>
         <p:cNvPr id="1" name="Shape 88"/>
         <p:cNvGrpSpPr/>
         <p:nvPr/>
@@ -2148,110 +2362,6 @@
       <p:sp>
         <p:nvSpPr>
           <p:cNvPr id="90" name="Google Shape;90;g15d8b2716ee_0_16:notes"/>
-          <p:cNvSpPr txBox="1">
-            <a:spLocks noGrp="1"/>
-          </p:cNvSpPr>
-          <p:nvPr>
-            <p:ph type="body" idx="1"/>
-          </p:nvPr>
-        </p:nvSpPr>
-        <p:spPr>
-          <a:xfrm>
-            <a:off x="685800" y="4343400"/>
-            <a:ext cx="5486400" cy="4114800"/>
-          </a:xfrm>
-          <a:prstGeom prst="rect">
-            <a:avLst/>
-          </a:prstGeom>
-        </p:spPr>
-        <p:txBody>
-          <a:bodyPr spcFirstLastPara="1" wrap="square" lIns="91425" tIns="91425" rIns="91425" bIns="91425" anchor="t" anchorCtr="0">
-            <a:noAutofit/>
-          </a:bodyPr>
-          <a:lstStyle/>
-          <a:p>
-            <a:pPr marL="0" lvl="0" indent="0" algn="l" rtl="0">
-              <a:spcBef>
-                <a:spcPts val="0"/>
-              </a:spcBef>
-              <a:spcAft>
-                <a:spcPts val="0"/>
-              </a:spcAft>
-              <a:buNone/>
-            </a:pPr>
-            <a:endParaRPr/>
-          </a:p>
-        </p:txBody>
-      </p:sp>
-    </p:spTree>
-  </p:cSld>
-  <p:clrMapOvr>
-    <a:masterClrMapping/>
-  </p:clrMapOvr>
-</p:notes>
-</file>
-
-<file path=ppt/notesSlides/notesSlide9.xml><?xml version="1.0" encoding="utf-8"?>
-<p:notes xmlns:a="http://schemas.openxmlformats.org/drawingml/2006/main" xmlns:r="http://schemas.openxmlformats.org/officeDocument/2006/relationships" xmlns:p="http://schemas.openxmlformats.org/presentationml/2006/main" showMasterSp="0" showMasterPhAnim="0">
-  <p:cSld>
-    <p:spTree>
-      <p:nvGrpSpPr>
-        <p:cNvPr id="1" name="Shape 118"/>
-        <p:cNvGrpSpPr/>
-        <p:nvPr/>
-      </p:nvGrpSpPr>
-      <p:grpSpPr>
-        <a:xfrm>
-          <a:off x="0" y="0"/>
-          <a:ext cx="0" cy="0"/>
-          <a:chOff x="0" y="0"/>
-          <a:chExt cx="0" cy="0"/>
-        </a:xfrm>
-      </p:grpSpPr>
-      <p:sp>
-        <p:nvSpPr>
-          <p:cNvPr id="119" name="Google Shape;119;g15d8b2716ee_0_57:notes"/>
-          <p:cNvSpPr>
-            <a:spLocks noGrp="1" noRot="1" noChangeAspect="1"/>
-          </p:cNvSpPr>
-          <p:nvPr>
-            <p:ph type="sldImg" idx="2"/>
-          </p:nvPr>
-        </p:nvSpPr>
-        <p:spPr>
-          <a:xfrm>
-            <a:off x="381000" y="685800"/>
-            <a:ext cx="6096000" cy="3429000"/>
-          </a:xfrm>
-          <a:custGeom>
-            <a:avLst/>
-            <a:gdLst/>
-            <a:ahLst/>
-            <a:cxnLst/>
-            <a:rect l="l" t="t" r="r" b="b"/>
-            <a:pathLst>
-              <a:path w="120000" h="120000" extrusionOk="0">
-                <a:moveTo>
-                  <a:pt x="0" y="0"/>
-                </a:moveTo>
-                <a:lnTo>
-                  <a:pt x="120000" y="0"/>
-                </a:lnTo>
-                <a:lnTo>
-                  <a:pt x="120000" y="120000"/>
-                </a:lnTo>
-                <a:lnTo>
-                  <a:pt x="0" y="120000"/>
-                </a:lnTo>
-                <a:close/>
-              </a:path>
-            </a:pathLst>
-          </a:custGeom>
-        </p:spPr>
-      </p:sp>
-      <p:sp>
-        <p:nvSpPr>
-          <p:cNvPr id="120" name="Google Shape;120;g15d8b2716ee_0_57:notes"/>
           <p:cNvSpPr txBox="1">
             <a:spLocks noGrp="1"/>
           </p:cNvSpPr>
@@ -7020,6 +7130,363 @@
     </p:bg>
     <p:spTree>
       <p:nvGrpSpPr>
+        <p:cNvPr id="1" name="Shape 121"/>
+        <p:cNvGrpSpPr/>
+        <p:nvPr/>
+      </p:nvGrpSpPr>
+      <p:grpSpPr>
+        <a:xfrm>
+          <a:off x="0" y="0"/>
+          <a:ext cx="0" cy="0"/>
+          <a:chOff x="0" y="0"/>
+          <a:chExt cx="0" cy="0"/>
+        </a:xfrm>
+      </p:grpSpPr>
+      <p:sp>
+        <p:nvSpPr>
+          <p:cNvPr id="122" name="Google Shape;122;p24"/>
+          <p:cNvSpPr txBox="1">
+            <a:spLocks noGrp="1"/>
+          </p:cNvSpPr>
+          <p:nvPr>
+            <p:ph type="title"/>
+          </p:nvPr>
+        </p:nvSpPr>
+        <p:spPr>
+          <a:xfrm>
+            <a:off x="311700" y="445025"/>
+            <a:ext cx="8520600" cy="572700"/>
+          </a:xfrm>
+          <a:prstGeom prst="rect">
+            <a:avLst/>
+          </a:prstGeom>
+        </p:spPr>
+        <p:txBody>
+          <a:bodyPr spcFirstLastPara="1" wrap="square" lIns="91425" tIns="91425" rIns="91425" bIns="91425" anchor="t" anchorCtr="0">
+            <a:normAutofit fontScale="90000"/>
+          </a:bodyPr>
+          <a:lstStyle/>
+          <a:p>
+            <a:pPr marL="0" lvl="0" indent="0" algn="l" rtl="0">
+              <a:spcBef>
+                <a:spcPts val="0"/>
+              </a:spcBef>
+              <a:spcAft>
+                <a:spcPts val="0"/>
+              </a:spcAft>
+              <a:buNone/>
+            </a:pPr>
+            <a:r>
+              <a:rPr lang="en">
+                <a:latin typeface="Calibri"/>
+                <a:ea typeface="Calibri"/>
+                <a:cs typeface="Calibri"/>
+                <a:sym typeface="Calibri"/>
+              </a:rPr>
+              <a:t>Limitaciones</a:t>
+            </a:r>
+            <a:endParaRPr>
+              <a:latin typeface="Calibri"/>
+              <a:ea typeface="Calibri"/>
+              <a:cs typeface="Calibri"/>
+              <a:sym typeface="Calibri"/>
+            </a:endParaRPr>
+          </a:p>
+        </p:txBody>
+      </p:sp>
+      <p:sp>
+        <p:nvSpPr>
+          <p:cNvPr id="123" name="Google Shape;123;p24"/>
+          <p:cNvSpPr txBox="1">
+            <a:spLocks noGrp="1"/>
+          </p:cNvSpPr>
+          <p:nvPr>
+            <p:ph type="body" idx="1"/>
+          </p:nvPr>
+        </p:nvSpPr>
+        <p:spPr>
+          <a:xfrm>
+            <a:off x="311700" y="1152475"/>
+            <a:ext cx="8520600" cy="3416400"/>
+          </a:xfrm>
+          <a:prstGeom prst="rect">
+            <a:avLst/>
+          </a:prstGeom>
+        </p:spPr>
+        <p:txBody>
+          <a:bodyPr spcFirstLastPara="1" wrap="square" lIns="91425" tIns="91425" rIns="91425" bIns="91425" anchor="t" anchorCtr="0">
+            <a:normAutofit lnSpcReduction="10000"/>
+          </a:bodyPr>
+          <a:lstStyle/>
+          <a:p>
+            <a:pPr marL="457200" lvl="0" indent="-342900" algn="l" rtl="0">
+              <a:spcBef>
+                <a:spcPts val="1200"/>
+              </a:spcBef>
+              <a:spcAft>
+                <a:spcPts val="0"/>
+              </a:spcAft>
+              <a:buSzPts val="1800"/>
+              <a:buFont typeface="Calibri"/>
+              <a:buChar char="●"/>
+            </a:pPr>
+            <a:r>
+              <a:rPr lang="es-ES" dirty="0">
+                <a:latin typeface="Calibri"/>
+                <a:ea typeface="Calibri"/>
+                <a:cs typeface="Calibri"/>
+                <a:sym typeface="Calibri"/>
+              </a:rPr>
+              <a:t>La tendencia tiene una ventana de 6 elementos.</a:t>
+            </a:r>
+          </a:p>
+          <a:p>
+            <a:pPr marL="457200" lvl="0" indent="-342900" algn="l" rtl="0">
+              <a:spcBef>
+                <a:spcPts val="1200"/>
+              </a:spcBef>
+              <a:spcAft>
+                <a:spcPts val="0"/>
+              </a:spcAft>
+              <a:buSzPts val="1800"/>
+              <a:buFont typeface="Calibri"/>
+              <a:buChar char="●"/>
+            </a:pPr>
+            <a:r>
+              <a:rPr lang="es-ES" dirty="0">
+                <a:latin typeface="Calibri"/>
+                <a:ea typeface="Calibri"/>
+                <a:cs typeface="Calibri"/>
+                <a:sym typeface="Calibri"/>
+              </a:rPr>
+              <a:t>Se </a:t>
+            </a:r>
+            <a:r>
+              <a:rPr lang="es-ES" dirty="0" err="1">
+                <a:latin typeface="Calibri"/>
+                <a:ea typeface="Calibri"/>
+                <a:cs typeface="Calibri"/>
+                <a:sym typeface="Calibri"/>
+              </a:rPr>
+              <a:t>utiliz</a:t>
+            </a:r>
+            <a:r>
+              <a:rPr lang="es-AR" dirty="0" err="1">
+                <a:latin typeface="Calibri"/>
+                <a:ea typeface="Calibri"/>
+                <a:cs typeface="Calibri"/>
+                <a:sym typeface="Calibri"/>
+              </a:rPr>
+              <a:t>ó</a:t>
+            </a:r>
+            <a:r>
+              <a:rPr lang="es-AR" dirty="0">
+                <a:latin typeface="Calibri"/>
+                <a:ea typeface="Calibri"/>
+                <a:cs typeface="Calibri"/>
+                <a:sym typeface="Calibri"/>
+              </a:rPr>
+              <a:t> una semilla durante la optimización bayesiana por una cuestión de tiempo.</a:t>
+            </a:r>
+            <a:endParaRPr dirty="0">
+              <a:latin typeface="Calibri"/>
+              <a:ea typeface="Calibri"/>
+              <a:cs typeface="Calibri"/>
+              <a:sym typeface="Calibri"/>
+            </a:endParaRPr>
+          </a:p>
+          <a:p>
+            <a:pPr marL="457200" lvl="0" indent="-342900" algn="l" rtl="0">
+              <a:spcBef>
+                <a:spcPts val="0"/>
+              </a:spcBef>
+              <a:spcAft>
+                <a:spcPts val="0"/>
+              </a:spcAft>
+              <a:buSzPts val="1800"/>
+              <a:buFont typeface="Calibri"/>
+              <a:buChar char="●"/>
+            </a:pPr>
+            <a:r>
+              <a:rPr lang="es-AR" dirty="0">
+                <a:latin typeface="Calibri"/>
+                <a:ea typeface="Calibri"/>
+                <a:cs typeface="Calibri"/>
+                <a:sym typeface="Calibri"/>
+              </a:rPr>
+              <a:t>Se utilizaron solo 50 iteraciones de optimización bayesiana.</a:t>
+            </a:r>
+            <a:endParaRPr dirty="0">
+              <a:latin typeface="Calibri"/>
+              <a:ea typeface="Calibri"/>
+              <a:cs typeface="Calibri"/>
+              <a:sym typeface="Calibri"/>
+            </a:endParaRPr>
+          </a:p>
+          <a:p>
+            <a:pPr marL="457200" lvl="0" indent="-342900" algn="l" rtl="0">
+              <a:spcBef>
+                <a:spcPts val="0"/>
+              </a:spcBef>
+              <a:spcAft>
+                <a:spcPts val="0"/>
+              </a:spcAft>
+              <a:buSzPts val="1800"/>
+              <a:buFont typeface="Calibri"/>
+              <a:buChar char="●"/>
+            </a:pPr>
+            <a:r>
+              <a:rPr lang="es-AR" dirty="0">
+                <a:latin typeface="Calibri"/>
+                <a:ea typeface="Calibri"/>
+                <a:cs typeface="Calibri"/>
+                <a:sym typeface="Calibri"/>
+              </a:rPr>
+              <a:t>La estrategia de entrenamiento utilizó un solo mes para entrenar y uno para probar, no hay garantía de que se extienda a otros diseños experimentales.</a:t>
+            </a:r>
+          </a:p>
+          <a:p>
+            <a:pPr marL="457200" lvl="0" indent="-342900" algn="l" rtl="0">
+              <a:spcBef>
+                <a:spcPts val="0"/>
+              </a:spcBef>
+              <a:spcAft>
+                <a:spcPts val="0"/>
+              </a:spcAft>
+              <a:buSzPts val="1800"/>
+              <a:buFont typeface="Calibri"/>
+              <a:buChar char="●"/>
+            </a:pPr>
+            <a:r>
+              <a:rPr lang="es-AR" dirty="0">
+                <a:latin typeface="Calibri"/>
+                <a:ea typeface="Calibri"/>
+                <a:cs typeface="Calibri"/>
+                <a:sym typeface="Calibri"/>
+              </a:rPr>
+              <a:t>No se estudian qué pasa con las combinaciones de </a:t>
+            </a:r>
+            <a:r>
+              <a:rPr lang="es-AR" dirty="0" err="1">
+                <a:latin typeface="Calibri"/>
+                <a:ea typeface="Calibri"/>
+                <a:cs typeface="Calibri"/>
+                <a:sym typeface="Calibri"/>
+              </a:rPr>
+              <a:t>features</a:t>
+            </a:r>
+            <a:r>
+              <a:rPr lang="es-AR" dirty="0">
+                <a:latin typeface="Calibri"/>
+                <a:ea typeface="Calibri"/>
+                <a:cs typeface="Calibri"/>
+                <a:sym typeface="Calibri"/>
+              </a:rPr>
+              <a:t> (por ejemplo, un </a:t>
+            </a:r>
+            <a:r>
+              <a:rPr lang="es-AR" dirty="0" err="1">
+                <a:latin typeface="Calibri"/>
+                <a:ea typeface="Calibri"/>
+                <a:cs typeface="Calibri"/>
+                <a:sym typeface="Calibri"/>
+              </a:rPr>
+              <a:t>dataset</a:t>
+            </a:r>
+            <a:r>
+              <a:rPr lang="es-AR" dirty="0">
+                <a:latin typeface="Calibri"/>
+                <a:ea typeface="Calibri"/>
+                <a:cs typeface="Calibri"/>
+                <a:sym typeface="Calibri"/>
+              </a:rPr>
+              <a:t> con las diferencias mes a mes y las aceleraciones). Puede haber cierta redundancia de información en estos casos por ser combinaciones lineales de valores de cada mes.</a:t>
+            </a:r>
+          </a:p>
+          <a:p>
+            <a:pPr marL="457200" lvl="0" indent="-342900" algn="l" rtl="0">
+              <a:spcBef>
+                <a:spcPts val="0"/>
+              </a:spcBef>
+              <a:spcAft>
+                <a:spcPts val="0"/>
+              </a:spcAft>
+              <a:buSzPts val="1800"/>
+              <a:buFont typeface="Calibri"/>
+              <a:buChar char="●"/>
+            </a:pPr>
+            <a:r>
+              <a:rPr lang="es-AR" dirty="0">
+                <a:latin typeface="Calibri"/>
+                <a:ea typeface="Calibri"/>
+                <a:cs typeface="Calibri"/>
+                <a:sym typeface="Calibri"/>
+              </a:rPr>
+              <a:t>Las conclusiones no necesariamente se extrapolan a otros </a:t>
+            </a:r>
+            <a:r>
+              <a:rPr lang="es-AR" dirty="0" err="1">
+                <a:latin typeface="Calibri"/>
+                <a:ea typeface="Calibri"/>
+                <a:cs typeface="Calibri"/>
+                <a:sym typeface="Calibri"/>
+              </a:rPr>
+              <a:t>datasets</a:t>
+            </a:r>
+            <a:r>
+              <a:rPr lang="es-AR" dirty="0">
+                <a:latin typeface="Calibri"/>
+                <a:ea typeface="Calibri"/>
+                <a:cs typeface="Calibri"/>
+                <a:sym typeface="Calibri"/>
+              </a:rPr>
+              <a:t>.</a:t>
+            </a:r>
+            <a:endParaRPr dirty="0">
+              <a:latin typeface="Calibri"/>
+              <a:ea typeface="Calibri"/>
+              <a:cs typeface="Calibri"/>
+              <a:sym typeface="Calibri"/>
+            </a:endParaRPr>
+          </a:p>
+          <a:p>
+            <a:pPr marL="0" lvl="0" indent="0" algn="l" rtl="0">
+              <a:spcBef>
+                <a:spcPts val="1200"/>
+              </a:spcBef>
+              <a:spcAft>
+                <a:spcPts val="1200"/>
+              </a:spcAft>
+              <a:buNone/>
+            </a:pPr>
+            <a:endParaRPr dirty="0"/>
+          </a:p>
+        </p:txBody>
+      </p:sp>
+    </p:spTree>
+  </p:cSld>
+  <p:clrMapOvr>
+    <a:masterClrMapping/>
+  </p:clrMapOvr>
+</p:sld>
+</file>
+
+<file path=ppt/slides/slide11.xml><?xml version="1.0" encoding="utf-8"?>
+<p:sld xmlns:a="http://schemas.openxmlformats.org/drawingml/2006/main" xmlns:r="http://schemas.openxmlformats.org/officeDocument/2006/relationships" xmlns:p="http://schemas.openxmlformats.org/presentationml/2006/main">
+  <p:cSld>
+    <p:bg>
+      <p:bgPr>
+        <a:solidFill>
+          <a:schemeClr val="accent1">
+            <a:lumMod val="60000"/>
+            <a:lumOff val="40000"/>
+          </a:schemeClr>
+        </a:solidFill>
+        <a:effectLst/>
+      </p:bgPr>
+    </p:bg>
+    <p:spTree>
+      <p:nvGrpSpPr>
         <p:cNvPr id="1" name="Shape 127"/>
         <p:cNvGrpSpPr/>
         <p:nvPr/>
@@ -7195,7 +7662,7 @@
 </p:sld>
 </file>
 
-<file path=ppt/slides/slide11.xml><?xml version="1.0" encoding="utf-8"?>
+<file path=ppt/slides/slide12.xml><?xml version="1.0" encoding="utf-8"?>
 <p:sld xmlns:a="http://schemas.openxmlformats.org/drawingml/2006/main" xmlns:r="http://schemas.openxmlformats.org/officeDocument/2006/relationships" xmlns:p="http://schemas.openxmlformats.org/presentationml/2006/main">
   <p:cSld>
     <p:bg>
@@ -7394,7 +7861,7 @@
 </p:sld>
 </file>
 
-<file path=ppt/slides/slide12.xml><?xml version="1.0" encoding="utf-8"?>
+<file path=ppt/slides/slide13.xml><?xml version="1.0" encoding="utf-8"?>
 <p:sld xmlns:a="http://schemas.openxmlformats.org/drawingml/2006/main" xmlns:r="http://schemas.openxmlformats.org/officeDocument/2006/relationships" xmlns:p="http://schemas.openxmlformats.org/presentationml/2006/main">
   <p:cSld>
     <p:bg>
@@ -7457,15 +7924,15 @@
               <a:buNone/>
             </a:pPr>
             <a:r>
-              <a:rPr lang="en">
+              <a:rPr lang="en" dirty="0">
                 <a:latin typeface="Calibri"/>
                 <a:ea typeface="Calibri"/>
                 <a:cs typeface="Calibri"/>
                 <a:sym typeface="Calibri"/>
               </a:rPr>
-              <a:t>Discusión (de los resultados) </a:t>
+              <a:t>Discusión</a:t>
             </a:r>
-            <a:endParaRPr>
+            <a:endParaRPr dirty="0">
               <a:latin typeface="Calibri"/>
               <a:ea typeface="Calibri"/>
               <a:cs typeface="Calibri"/>
@@ -7474,8 +7941,8 @@
           </a:p>
         </p:txBody>
       </p:sp>
-      <mc:AlternateContent xmlns:mc="http://schemas.openxmlformats.org/markup-compatibility/2006">
-        <mc:Choice xmlns:a14="http://schemas.microsoft.com/office/drawing/2010/main" Requires="a14">
+      <mc:AlternateContent xmlns:mc="http://schemas.openxmlformats.org/markup-compatibility/2006" xmlns:a14="http://schemas.microsoft.com/office/drawing/2010/main">
+        <mc:Choice Requires="a14">
           <p:sp>
             <p:nvSpPr>
               <p:cNvPr id="135" name="Google Shape;135;p26"/>
@@ -7704,7 +8171,7 @@
             </p:txBody>
           </p:sp>
         </mc:Choice>
-        <mc:Fallback>
+        <mc:Fallback xmlns="">
           <p:sp>
             <p:nvSpPr>
               <p:cNvPr id="135" name="Google Shape;135;p26"/>
@@ -7753,7 +8220,7 @@
 </p:sld>
 </file>
 
-<file path=ppt/slides/slide13.xml><?xml version="1.0" encoding="utf-8"?>
+<file path=ppt/slides/slide14.xml><?xml version="1.0" encoding="utf-8"?>
 <p:sld xmlns:a="http://schemas.openxmlformats.org/drawingml/2006/main" xmlns:r="http://schemas.openxmlformats.org/officeDocument/2006/relationships" xmlns:p="http://schemas.openxmlformats.org/presentationml/2006/main">
   <p:cSld>
     <p:bg>
@@ -7893,7 +8360,7 @@
 </p:sld>
 </file>
 
-<file path=ppt/slides/slide14.xml><?xml version="1.0" encoding="utf-8"?>
+<file path=ppt/slides/slide15.xml><?xml version="1.0" encoding="utf-8"?>
 <p:sld xmlns:a="http://schemas.openxmlformats.org/drawingml/2006/main" xmlns:r="http://schemas.openxmlformats.org/officeDocument/2006/relationships" xmlns:p="http://schemas.openxmlformats.org/presentationml/2006/main">
   <p:cSld>
     <p:bg>
@@ -8216,7 +8683,7 @@
 </p:sld>
 </file>
 
-<file path=ppt/slides/slide15.xml><?xml version="1.0" encoding="utf-8"?>
+<file path=ppt/slides/slide16.xml><?xml version="1.0" encoding="utf-8"?>
 <p:sld xmlns:a="http://schemas.openxmlformats.org/drawingml/2006/main" xmlns:r="http://schemas.openxmlformats.org/officeDocument/2006/relationships" xmlns:p="http://schemas.openxmlformats.org/presentationml/2006/main">
   <p:cSld>
     <p:bg>
@@ -8778,8 +9245,8 @@
           </a:p>
         </p:txBody>
       </p:sp>
-      <mc:AlternateContent xmlns:mc="http://schemas.openxmlformats.org/markup-compatibility/2006">
-        <mc:Choice xmlns:a14="http://schemas.microsoft.com/office/drawing/2010/main" Requires="a14">
+      <mc:AlternateContent xmlns:mc="http://schemas.openxmlformats.org/markup-compatibility/2006" xmlns:a14="http://schemas.microsoft.com/office/drawing/2010/main">
+        <mc:Choice Requires="a14">
           <p:sp>
             <p:nvSpPr>
               <p:cNvPr id="75" name="Google Shape;75;p16"/>
@@ -10301,7 +10768,7 @@
             </p:txBody>
           </p:sp>
         </mc:Choice>
-        <mc:Fallback>
+        <mc:Fallback xmlns="">
           <p:sp>
             <p:nvSpPr>
               <p:cNvPr id="75" name="Google Shape;75;p16"/>
@@ -10435,8 +10902,8 @@
           </a:p>
         </p:txBody>
       </p:sp>
-      <mc:AlternateContent xmlns:mc="http://schemas.openxmlformats.org/markup-compatibility/2006">
-        <mc:Choice xmlns:a14="http://schemas.microsoft.com/office/drawing/2010/main" Requires="a14">
+      <mc:AlternateContent xmlns:mc="http://schemas.openxmlformats.org/markup-compatibility/2006" xmlns:a14="http://schemas.microsoft.com/office/drawing/2010/main">
+        <mc:Choice Requires="a14">
           <p:sp>
             <p:nvSpPr>
               <p:cNvPr id="75" name="Google Shape;75;p16"/>
@@ -11444,15 +11911,7 @@
                           <a:cs typeface="Calibri"/>
                           <a:sym typeface="Calibri"/>
                         </a:rPr>
-                        <m:t>2</m:t>
-                      </m:r>
-                      <m:r>
-                        <a:rPr lang="es-ES" b="0" i="1" smtClean="0">
-                          <a:latin typeface="Cambria Math" panose="02040503050406030204" pitchFamily="18" charset="0"/>
-                          <a:cs typeface="Calibri"/>
-                          <a:sym typeface="Calibri"/>
-                        </a:rPr>
-                        <m:t>)</m:t>
+                        <m:t>2)</m:t>
                       </m:r>
                     </m:oMath>
                   </m:oMathPara>
@@ -11840,7 +12299,7 @@
             </p:txBody>
           </p:sp>
         </mc:Choice>
-        <mc:Fallback>
+        <mc:Fallback xmlns="">
           <p:sp>
             <p:nvSpPr>
               <p:cNvPr id="75" name="Google Shape;75;p16"/>
@@ -12427,7 +12886,7 @@
                     <a:cs typeface="Calibri"/>
                     <a:sym typeface="Calibri"/>
                   </a:rPr>
-                  <a:t>Se traduce en la práctica como</a:t>
+                  <a:t>En la práctica las series de tiempo son funciones discretizadas</a:t>
                 </a:r>
                 <a:r>
                   <a:rPr lang="es-ES" dirty="0">
@@ -12472,10 +12931,11 @@
                           </m:r>
                           <m:d>
                             <m:dPr>
+                              <m:begChr m:val="["/>
+                              <m:endChr m:val="]"/>
                               <m:ctrlPr>
-                                <a:rPr lang="es-ES" i="1">
+                                <a:rPr lang="es-AR" i="1" smtClean="0">
                                   <a:latin typeface="Cambria Math" panose="02040503050406030204" pitchFamily="18" charset="0"/>
-                                  <a:ea typeface="Calibri"/>
                                   <a:cs typeface="Calibri"/>
                                   <a:sym typeface="Calibri"/>
                                 </a:rPr>
@@ -12485,11 +12945,10 @@
                               <m:r>
                                 <a:rPr lang="es-ES" b="0" i="1" smtClean="0">
                                   <a:latin typeface="Cambria Math" panose="02040503050406030204" pitchFamily="18" charset="0"/>
-                                  <a:ea typeface="Calibri"/>
                                   <a:cs typeface="Calibri"/>
                                   <a:sym typeface="Calibri"/>
                                 </a:rPr>
-                                <m:t>0</m:t>
+                                <m:t>𝑚</m:t>
                               </m:r>
                             </m:e>
                           </m:d>
@@ -12513,10 +12972,11 @@
                           </m:r>
                           <m:d>
                             <m:dPr>
+                              <m:begChr m:val="["/>
+                              <m:endChr m:val="]"/>
                               <m:ctrlPr>
-                                <a:rPr lang="es-ES" i="1">
+                                <a:rPr lang="es-AR" i="1" smtClean="0">
                                   <a:latin typeface="Cambria Math" panose="02040503050406030204" pitchFamily="18" charset="0"/>
-                                  <a:ea typeface="Calibri"/>
                                   <a:cs typeface="Calibri"/>
                                   <a:sym typeface="Calibri"/>
                                 </a:rPr>
@@ -12526,7 +12986,14 @@
                               <m:r>
                                 <a:rPr lang="es-ES" b="0" i="1" smtClean="0">
                                   <a:latin typeface="Cambria Math" panose="02040503050406030204" pitchFamily="18" charset="0"/>
-                                  <a:ea typeface="Calibri"/>
+                                  <a:cs typeface="Calibri"/>
+                                  <a:sym typeface="Calibri"/>
+                                </a:rPr>
+                                <m:t>𝑚</m:t>
+                              </m:r>
+                              <m:r>
+                                <a:rPr lang="es-ES" b="0" i="1" smtClean="0">
+                                  <a:latin typeface="Cambria Math" panose="02040503050406030204" pitchFamily="18" charset="0"/>
                                   <a:cs typeface="Calibri"/>
                                   <a:sym typeface="Calibri"/>
                                 </a:rPr>
@@ -12554,10 +13021,11 @@
                           </m:r>
                           <m:d>
                             <m:dPr>
+                              <m:begChr m:val="["/>
+                              <m:endChr m:val="]"/>
                               <m:ctrlPr>
-                                <a:rPr lang="es-ES" i="1">
+                                <a:rPr lang="es-AR" i="1" smtClean="0">
                                   <a:latin typeface="Cambria Math" panose="02040503050406030204" pitchFamily="18" charset="0"/>
-                                  <a:ea typeface="Calibri"/>
                                   <a:cs typeface="Calibri"/>
                                   <a:sym typeface="Calibri"/>
                                 </a:rPr>
@@ -12565,13 +13033,20 @@
                             </m:dPr>
                             <m:e>
                               <m:r>
-                                <a:rPr lang="es-ES" i="1">
+                                <a:rPr lang="es-ES" b="0" i="1" smtClean="0">
                                   <a:latin typeface="Cambria Math" panose="02040503050406030204" pitchFamily="18" charset="0"/>
-                                  <a:ea typeface="Calibri"/>
                                   <a:cs typeface="Calibri"/>
                                   <a:sym typeface="Calibri"/>
                                 </a:rPr>
-                                <m:t>−2</m:t>
+                                <m:t>𝑚</m:t>
+                              </m:r>
+                              <m:r>
+                                <a:rPr lang="es-ES" b="0" i="1" smtClean="0">
+                                  <a:latin typeface="Cambria Math" panose="02040503050406030204" pitchFamily="18" charset="0"/>
+                                  <a:cs typeface="Calibri"/>
+                                  <a:sym typeface="Calibri"/>
+                                </a:rPr>
+                                <m:t>−1</m:t>
                               </m:r>
                             </m:e>
                           </m:d>
@@ -12657,13 +13132,13 @@
                       </m:dPr>
                       <m:e>
                         <m:r>
-                          <a:rPr lang="es-ES" b="0" i="1" smtClean="0">
+                          <a:rPr lang="es-AR" b="0" i="1" smtClean="0">
                             <a:latin typeface="Cambria Math" panose="02040503050406030204" pitchFamily="18" charset="0"/>
                             <a:ea typeface="Calibri"/>
                             <a:cs typeface="Calibri"/>
                             <a:sym typeface="Calibri"/>
                           </a:rPr>
-                          <m:t>0</m:t>
+                          <m:t>𝑚</m:t>
                         </m:r>
                       </m:e>
                     </m:d>
@@ -12720,6 +13195,15 @@
                       </m:dPr>
                       <m:e>
                         <m:r>
+                          <a:rPr lang="es-AR" b="0" i="1" smtClean="0">
+                            <a:latin typeface="Cambria Math" panose="02040503050406030204" pitchFamily="18" charset="0"/>
+                            <a:ea typeface="Calibri"/>
+                            <a:cs typeface="Calibri"/>
+                            <a:sym typeface="Calibri"/>
+                          </a:rPr>
+                          <m:t>𝑚</m:t>
+                        </m:r>
+                        <m:r>
                           <a:rPr lang="es-ES" i="1">
                             <a:latin typeface="Cambria Math" panose="02040503050406030204" pitchFamily="18" charset="0"/>
                             <a:ea typeface="Calibri"/>
@@ -12739,7 +13223,47 @@
                     <a:cs typeface="Calibri"/>
                     <a:sym typeface="Calibri"/>
                   </a:rPr>
-                  <a:t> en el anterior, etc. Esto solo puede llamarse aceleración si la serie de tiempo es suficientemente lenta.</a:t>
+                  <a:t> en el anterior (</a:t>
+                </a:r>
+                <a14:m>
+                  <m:oMath xmlns:m="http://schemas.openxmlformats.org/officeDocument/2006/math">
+                    <m:r>
+                      <a:rPr lang="es-ES" b="0" i="1" smtClean="0">
+                        <a:latin typeface="Cambria Math" panose="02040503050406030204" pitchFamily="18" charset="0"/>
+                        <a:ea typeface="Calibri"/>
+                        <a:cs typeface="Calibri"/>
+                        <a:sym typeface="Calibri"/>
+                      </a:rPr>
+                      <m:t>1</m:t>
+                    </m:r>
+                    <m:r>
+                      <a:rPr lang="es-ES" b="0" i="1" smtClean="0">
+                        <a:latin typeface="Cambria Math" panose="02040503050406030204" pitchFamily="18" charset="0"/>
+                        <a:ea typeface="Calibri"/>
+                        <a:cs typeface="Calibri"/>
+                        <a:sym typeface="Calibri"/>
+                      </a:rPr>
+                      <m:t>𝑚𝑒𝑠</m:t>
+                    </m:r>
+                    <m:r>
+                      <a:rPr lang="es-ES" b="0" i="1" smtClean="0">
+                        <a:latin typeface="Cambria Math" panose="02040503050406030204" pitchFamily="18" charset="0"/>
+                        <a:ea typeface="Cambria Math" panose="02040503050406030204" pitchFamily="18" charset="0"/>
+                        <a:cs typeface="Calibri"/>
+                        <a:sym typeface="Calibri"/>
+                      </a:rPr>
+                      <m:t>≡1</m:t>
+                    </m:r>
+                  </m:oMath>
+                </a14:m>
+                <a:r>
+                  <a:rPr lang="es-ES" dirty="0">
+                    <a:latin typeface="Calibri"/>
+                    <a:ea typeface="Calibri"/>
+                    <a:cs typeface="Calibri"/>
+                    <a:sym typeface="Calibri"/>
+                  </a:rPr>
+                  <a:t> en el espacio discreto), etc. Esto solo puede llamarse aceleración si la serie de tiempo es suficientemente lenta.</a:t>
                 </a:r>
               </a:p>
               <a:p>
@@ -12778,7 +13302,7 @@
               <a:blipFill>
                 <a:blip r:embed="rId3"/>
                 <a:stretch>
-                  <a:fillRect l="-572"/>
+                  <a:fillRect l="-572" r="-1144"/>
                 </a:stretch>
               </a:blipFill>
             </p:spPr>
@@ -12925,6 +13449,15 @@
               <a:buNone/>
             </a:pPr>
             <a:r>
+              <a:rPr lang="es-ES" dirty="0">
+                <a:latin typeface="Calibri"/>
+                <a:ea typeface="Calibri"/>
+                <a:cs typeface="Calibri"/>
+                <a:sym typeface="Calibri"/>
+              </a:rPr>
+              <a:t>-</a:t>
+            </a:r>
+            <a:r>
               <a:rPr lang="es-AR" dirty="0">
                 <a:latin typeface="Calibri"/>
                 <a:ea typeface="Calibri"/>
@@ -12986,6 +13519,26 @@
                 <a:sym typeface="Calibri"/>
               </a:rPr>
               <a:t>.</a:t>
+            </a:r>
+          </a:p>
+          <a:p>
+            <a:pPr marL="0" lvl="0" indent="0" algn="l" rtl="0">
+              <a:spcBef>
+                <a:spcPts val="0"/>
+              </a:spcBef>
+              <a:spcAft>
+                <a:spcPts val="0"/>
+              </a:spcAft>
+              <a:buNone/>
+            </a:pPr>
+            <a:r>
+              <a:rPr lang="es-AR" dirty="0">
+                <a:latin typeface="Calibri"/>
+                <a:ea typeface="Calibri"/>
+                <a:cs typeface="Calibri"/>
+                <a:sym typeface="Calibri"/>
+              </a:rPr>
+              <a:t>-Al menos espero que sea mejor que la variación respecto al mes anterior.</a:t>
             </a:r>
             <a:endParaRPr dirty="0">
               <a:latin typeface="Calibri"/>
@@ -13541,6 +14094,205 @@
     </p:bg>
     <p:spTree>
       <p:nvGrpSpPr>
+        <p:cNvPr id="1" name="Shape 85"/>
+        <p:cNvGrpSpPr/>
+        <p:nvPr/>
+      </p:nvGrpSpPr>
+      <p:grpSpPr>
+        <a:xfrm>
+          <a:off x="0" y="0"/>
+          <a:ext cx="0" cy="0"/>
+          <a:chOff x="0" y="0"/>
+          <a:chExt cx="0" cy="0"/>
+        </a:xfrm>
+      </p:grpSpPr>
+      <p:sp>
+        <p:nvSpPr>
+          <p:cNvPr id="86" name="Google Shape;86;p18"/>
+          <p:cNvSpPr txBox="1">
+            <a:spLocks noGrp="1"/>
+          </p:cNvSpPr>
+          <p:nvPr>
+            <p:ph type="title"/>
+          </p:nvPr>
+        </p:nvSpPr>
+        <p:spPr>
+          <a:xfrm>
+            <a:off x="311700" y="445025"/>
+            <a:ext cx="8520600" cy="572700"/>
+          </a:xfrm>
+          <a:prstGeom prst="rect">
+            <a:avLst/>
+          </a:prstGeom>
+        </p:spPr>
+        <p:txBody>
+          <a:bodyPr spcFirstLastPara="1" wrap="square" lIns="91425" tIns="91425" rIns="91425" bIns="91425" anchor="t" anchorCtr="0">
+            <a:normAutofit fontScale="90000"/>
+          </a:bodyPr>
+          <a:lstStyle/>
+          <a:p>
+            <a:pPr marL="0" lvl="0" indent="0" algn="l" rtl="0">
+              <a:spcBef>
+                <a:spcPts val="0"/>
+              </a:spcBef>
+              <a:spcAft>
+                <a:spcPts val="0"/>
+              </a:spcAft>
+              <a:buNone/>
+            </a:pPr>
+            <a:r>
+              <a:rPr lang="en">
+                <a:latin typeface="Calibri"/>
+                <a:ea typeface="Calibri"/>
+                <a:cs typeface="Calibri"/>
+                <a:sym typeface="Calibri"/>
+              </a:rPr>
+              <a:t>Revisión de Bibliografía</a:t>
+            </a:r>
+            <a:endParaRPr>
+              <a:latin typeface="Calibri"/>
+              <a:ea typeface="Calibri"/>
+              <a:cs typeface="Calibri"/>
+              <a:sym typeface="Calibri"/>
+            </a:endParaRPr>
+          </a:p>
+        </p:txBody>
+      </p:sp>
+      <p:sp>
+        <p:nvSpPr>
+          <p:cNvPr id="87" name="Google Shape;87;p18"/>
+          <p:cNvSpPr txBox="1">
+            <a:spLocks noGrp="1"/>
+          </p:cNvSpPr>
+          <p:nvPr>
+            <p:ph type="body" idx="1"/>
+          </p:nvPr>
+        </p:nvSpPr>
+        <p:spPr>
+          <a:xfrm>
+            <a:off x="311700" y="1152475"/>
+            <a:ext cx="8520600" cy="3416400"/>
+          </a:xfrm>
+          <a:prstGeom prst="rect">
+            <a:avLst/>
+          </a:prstGeom>
+        </p:spPr>
+        <p:txBody>
+          <a:bodyPr spcFirstLastPara="1" wrap="square" lIns="91425" tIns="91425" rIns="91425" bIns="91425" anchor="t" anchorCtr="0">
+            <a:normAutofit/>
+          </a:bodyPr>
+          <a:lstStyle/>
+          <a:p>
+            <a:pPr marL="0" lvl="0" indent="0" algn="l" rtl="0">
+              <a:spcBef>
+                <a:spcPts val="0"/>
+              </a:spcBef>
+              <a:spcAft>
+                <a:spcPts val="1200"/>
+              </a:spcAft>
+              <a:buNone/>
+            </a:pPr>
+            <a:endParaRPr dirty="0">
+              <a:latin typeface="Calibri"/>
+              <a:ea typeface="Calibri"/>
+              <a:cs typeface="Calibri"/>
+              <a:sym typeface="Calibri"/>
+            </a:endParaRPr>
+          </a:p>
+        </p:txBody>
+      </p:sp>
+      <p:graphicFrame>
+        <p:nvGraphicFramePr>
+          <p:cNvPr id="2" name="Object 1">
+            <a:extLst>
+              <a:ext uri="{FF2B5EF4-FFF2-40B4-BE49-F238E27FC236}">
+                <a16:creationId xmlns:a16="http://schemas.microsoft.com/office/drawing/2014/main" id="{5EDB8C2F-2CF5-C23D-5A5E-4C0850E621C9}"/>
+              </a:ext>
+            </a:extLst>
+          </p:cNvPr>
+          <p:cNvGraphicFramePr>
+            <a:graphicFrameLocks noChangeAspect="1"/>
+          </p:cNvGraphicFramePr>
+          <p:nvPr>
+            <p:extLst>
+              <p:ext uri="{D42A27DB-BD31-4B8C-83A1-F6EECF244321}">
+                <p14:modId xmlns:p14="http://schemas.microsoft.com/office/powerpoint/2010/main" val="3771015222"/>
+              </p:ext>
+            </p:extLst>
+          </p:nvPr>
+        </p:nvGraphicFramePr>
+        <p:xfrm>
+          <a:off x="223188" y="1173355"/>
+          <a:ext cx="8609112" cy="3525120"/>
+        </p:xfrm>
+        <a:graphic>
+          <a:graphicData uri="http://schemas.openxmlformats.org/presentationml/2006/ole">
+            <mc:AlternateContent xmlns:mc="http://schemas.openxmlformats.org/markup-compatibility/2006">
+              <mc:Choice xmlns:v="urn:schemas-microsoft-com:vml" Requires="v">
+                <p:oleObj name="Bitmap Image" r:id="rId3" imgW="14348520" imgH="5875200" progId="PBrush">
+                  <p:embed/>
+                </p:oleObj>
+              </mc:Choice>
+              <mc:Fallback>
+                <p:oleObj name="Bitmap Image" r:id="rId3" imgW="14348520" imgH="5875200" progId="PBrush">
+                  <p:embed/>
+                  <p:pic>
+                    <p:nvPicPr>
+                      <p:cNvPr id="0" name=""/>
+                      <p:cNvPicPr/>
+                      <p:nvPr/>
+                    </p:nvPicPr>
+                    <p:blipFill>
+                      <a:blip r:embed="rId4"/>
+                      <a:stretch>
+                        <a:fillRect/>
+                      </a:stretch>
+                    </p:blipFill>
+                    <p:spPr>
+                      <a:xfrm>
+                        <a:off x="223188" y="1173355"/>
+                        <a:ext cx="8609112" cy="3525120"/>
+                      </a:xfrm>
+                      <a:prstGeom prst="rect">
+                        <a:avLst/>
+                      </a:prstGeom>
+                    </p:spPr>
+                  </p:pic>
+                </p:oleObj>
+              </mc:Fallback>
+            </mc:AlternateContent>
+          </a:graphicData>
+        </a:graphic>
+      </p:graphicFrame>
+    </p:spTree>
+    <p:extLst>
+      <p:ext uri="{BB962C8B-B14F-4D97-AF65-F5344CB8AC3E}">
+        <p14:creationId xmlns:p14="http://schemas.microsoft.com/office/powerpoint/2010/main" val="3194821095"/>
+      </p:ext>
+    </p:extLst>
+  </p:cSld>
+  <p:clrMapOvr>
+    <a:masterClrMapping/>
+  </p:clrMapOvr>
+</p:sld>
+</file>
+
+<file path=ppt/slides/slide9.xml><?xml version="1.0" encoding="utf-8"?>
+<p:sld xmlns:a="http://schemas.openxmlformats.org/drawingml/2006/main" xmlns:r="http://schemas.openxmlformats.org/officeDocument/2006/relationships" xmlns:p="http://schemas.openxmlformats.org/presentationml/2006/main">
+  <p:cSld>
+    <p:bg>
+      <p:bgPr>
+        <a:solidFill>
+          <a:schemeClr val="accent1">
+            <a:lumMod val="60000"/>
+            <a:lumOff val="40000"/>
+          </a:schemeClr>
+        </a:solidFill>
+        <a:effectLst/>
+      </p:bgPr>
+    </p:bg>
+    <p:spTree>
+      <p:nvGrpSpPr>
         <p:cNvPr id="1" name="Shape 91"/>
         <p:cNvGrpSpPr/>
         <p:nvPr/>
@@ -13628,7 +14380,7 @@
             </p:spPr>
             <p:txBody>
               <a:bodyPr spcFirstLastPara="1" wrap="square" lIns="91425" tIns="91425" rIns="91425" bIns="91425" anchor="t" anchorCtr="0">
-                <a:normAutofit/>
+                <a:normAutofit fontScale="92500"/>
               </a:bodyPr>
               <a:lstStyle/>
               <a:p>
@@ -13642,7 +14394,7 @@
                     <a:cs typeface="Calibri"/>
                     <a:sym typeface="Calibri"/>
                   </a:rPr>
-                  <a:t>-Se hacen varios experimentos para comparar el </a:t>
+                  <a:t>-Se hicieron varios experimentos para comparar el </a:t>
                 </a:r>
                 <a:r>
                   <a:rPr lang="es-ES" dirty="0" err="1">
@@ -13912,7 +14664,7 @@
                     <a:cs typeface="Calibri"/>
                     <a:sym typeface="Calibri"/>
                   </a:rPr>
-                  <a:t>. Se generan tres </a:t>
+                  <a:t>. Se generaron tres </a:t>
                 </a:r>
                 <a:r>
                   <a:rPr lang="es-ES" dirty="0" err="1">
@@ -14240,7 +14992,7 @@
                     <a:cs typeface="Calibri"/>
                     <a:sym typeface="Calibri"/>
                   </a:rPr>
-                  <a:t>-Se hacen </a:t>
+                  <a:t>-Se hicieron </a:t>
                 </a:r>
                 <a:r>
                   <a:rPr lang="es-ES" dirty="0" err="1">
@@ -14276,7 +15028,43 @@
                     <a:cs typeface="Calibri"/>
                     <a:sym typeface="Calibri"/>
                   </a:rPr>
-                  <a:t> en abril de 2019 (scripts HT777001z, HT777002z y HT777003z) y se estudian los resultados de entrenar con 50 semillas en junio de 2019 (scripts GA777001z, GA777002z y GA777003z).</a:t>
+                  <a:t> en abril de 2019 (scripts HT777001z, HT777002z y HT777003z) y se estudiaron los resultados de entrenar los </a:t>
+                </a:r>
+                <a:r>
+                  <a:rPr lang="es-ES" dirty="0" err="1">
+                    <a:latin typeface="Calibri"/>
+                    <a:ea typeface="Calibri"/>
+                    <a:cs typeface="Calibri"/>
+                    <a:sym typeface="Calibri"/>
+                  </a:rPr>
+                  <a:t>hiperpar</a:t>
+                </a:r>
+                <a:r>
+                  <a:rPr lang="es-AR" dirty="0" err="1">
+                    <a:latin typeface="Calibri"/>
+                    <a:ea typeface="Calibri"/>
+                    <a:cs typeface="Calibri"/>
+                    <a:sym typeface="Calibri"/>
+                  </a:rPr>
+                  <a:t>ámetros</a:t>
+                </a:r>
+                <a:r>
+                  <a:rPr lang="es-AR" dirty="0">
+                    <a:latin typeface="Calibri"/>
+                    <a:ea typeface="Calibri"/>
+                    <a:cs typeface="Calibri"/>
+                    <a:sym typeface="Calibri"/>
+                  </a:rPr>
+                  <a:t> obtenidos </a:t>
+                </a:r>
+                <a:r>
+                  <a:rPr lang="es-ES" dirty="0">
+                    <a:latin typeface="Calibri"/>
+                    <a:ea typeface="Calibri"/>
+                    <a:cs typeface="Calibri"/>
+                    <a:sym typeface="Calibri"/>
+                  </a:rPr>
+                  <a:t>con 50 semillas en junio de 2019 (scripts GA777001z, GA777002z y GA777003z).</a:t>
                 </a:r>
               </a:p>
               <a:p>
@@ -14338,7 +15126,7 @@
               <a:blipFill>
                 <a:blip r:embed="rId3"/>
                 <a:stretch>
-                  <a:fillRect l="-572" r="-1144" b="-714"/>
+                  <a:fillRect l="-429"/>
                 </a:stretch>
               </a:blipFill>
             </p:spPr>
@@ -14357,363 +15145,6 @@
           </p:sp>
         </mc:Fallback>
       </mc:AlternateContent>
-    </p:spTree>
-  </p:cSld>
-  <p:clrMapOvr>
-    <a:masterClrMapping/>
-  </p:clrMapOvr>
-</p:sld>
-</file>
-
-<file path=ppt/slides/slide9.xml><?xml version="1.0" encoding="utf-8"?>
-<p:sld xmlns:a="http://schemas.openxmlformats.org/drawingml/2006/main" xmlns:r="http://schemas.openxmlformats.org/officeDocument/2006/relationships" xmlns:p="http://schemas.openxmlformats.org/presentationml/2006/main">
-  <p:cSld>
-    <p:bg>
-      <p:bgPr>
-        <a:solidFill>
-          <a:schemeClr val="accent1">
-            <a:lumMod val="60000"/>
-            <a:lumOff val="40000"/>
-          </a:schemeClr>
-        </a:solidFill>
-        <a:effectLst/>
-      </p:bgPr>
-    </p:bg>
-    <p:spTree>
-      <p:nvGrpSpPr>
-        <p:cNvPr id="1" name="Shape 121"/>
-        <p:cNvGrpSpPr/>
-        <p:nvPr/>
-      </p:nvGrpSpPr>
-      <p:grpSpPr>
-        <a:xfrm>
-          <a:off x="0" y="0"/>
-          <a:ext cx="0" cy="0"/>
-          <a:chOff x="0" y="0"/>
-          <a:chExt cx="0" cy="0"/>
-        </a:xfrm>
-      </p:grpSpPr>
-      <p:sp>
-        <p:nvSpPr>
-          <p:cNvPr id="122" name="Google Shape;122;p24"/>
-          <p:cNvSpPr txBox="1">
-            <a:spLocks noGrp="1"/>
-          </p:cNvSpPr>
-          <p:nvPr>
-            <p:ph type="title"/>
-          </p:nvPr>
-        </p:nvSpPr>
-        <p:spPr>
-          <a:xfrm>
-            <a:off x="311700" y="445025"/>
-            <a:ext cx="8520600" cy="572700"/>
-          </a:xfrm>
-          <a:prstGeom prst="rect">
-            <a:avLst/>
-          </a:prstGeom>
-        </p:spPr>
-        <p:txBody>
-          <a:bodyPr spcFirstLastPara="1" wrap="square" lIns="91425" tIns="91425" rIns="91425" bIns="91425" anchor="t" anchorCtr="0">
-            <a:normAutofit fontScale="90000"/>
-          </a:bodyPr>
-          <a:lstStyle/>
-          <a:p>
-            <a:pPr marL="0" lvl="0" indent="0" algn="l" rtl="0">
-              <a:spcBef>
-                <a:spcPts val="0"/>
-              </a:spcBef>
-              <a:spcAft>
-                <a:spcPts val="0"/>
-              </a:spcAft>
-              <a:buNone/>
-            </a:pPr>
-            <a:r>
-              <a:rPr lang="en">
-                <a:latin typeface="Calibri"/>
-                <a:ea typeface="Calibri"/>
-                <a:cs typeface="Calibri"/>
-                <a:sym typeface="Calibri"/>
-              </a:rPr>
-              <a:t>Limitaciones</a:t>
-            </a:r>
-            <a:endParaRPr>
-              <a:latin typeface="Calibri"/>
-              <a:ea typeface="Calibri"/>
-              <a:cs typeface="Calibri"/>
-              <a:sym typeface="Calibri"/>
-            </a:endParaRPr>
-          </a:p>
-        </p:txBody>
-      </p:sp>
-      <p:sp>
-        <p:nvSpPr>
-          <p:cNvPr id="123" name="Google Shape;123;p24"/>
-          <p:cNvSpPr txBox="1">
-            <a:spLocks noGrp="1"/>
-          </p:cNvSpPr>
-          <p:nvPr>
-            <p:ph type="body" idx="1"/>
-          </p:nvPr>
-        </p:nvSpPr>
-        <p:spPr>
-          <a:xfrm>
-            <a:off x="311700" y="1152475"/>
-            <a:ext cx="8520600" cy="3416400"/>
-          </a:xfrm>
-          <a:prstGeom prst="rect">
-            <a:avLst/>
-          </a:prstGeom>
-        </p:spPr>
-        <p:txBody>
-          <a:bodyPr spcFirstLastPara="1" wrap="square" lIns="91425" tIns="91425" rIns="91425" bIns="91425" anchor="t" anchorCtr="0">
-            <a:normAutofit lnSpcReduction="10000"/>
-          </a:bodyPr>
-          <a:lstStyle/>
-          <a:p>
-            <a:pPr marL="457200" lvl="0" indent="-342900" algn="l" rtl="0">
-              <a:spcBef>
-                <a:spcPts val="1200"/>
-              </a:spcBef>
-              <a:spcAft>
-                <a:spcPts val="0"/>
-              </a:spcAft>
-              <a:buSzPts val="1800"/>
-              <a:buFont typeface="Calibri"/>
-              <a:buChar char="●"/>
-            </a:pPr>
-            <a:r>
-              <a:rPr lang="es-ES" dirty="0">
-                <a:latin typeface="Calibri"/>
-                <a:ea typeface="Calibri"/>
-                <a:cs typeface="Calibri"/>
-                <a:sym typeface="Calibri"/>
-              </a:rPr>
-              <a:t>La tendencia tiene una ventana de 6 elementos.</a:t>
-            </a:r>
-          </a:p>
-          <a:p>
-            <a:pPr marL="457200" lvl="0" indent="-342900" algn="l" rtl="0">
-              <a:spcBef>
-                <a:spcPts val="1200"/>
-              </a:spcBef>
-              <a:spcAft>
-                <a:spcPts val="0"/>
-              </a:spcAft>
-              <a:buSzPts val="1800"/>
-              <a:buFont typeface="Calibri"/>
-              <a:buChar char="●"/>
-            </a:pPr>
-            <a:r>
-              <a:rPr lang="es-ES" dirty="0">
-                <a:latin typeface="Calibri"/>
-                <a:ea typeface="Calibri"/>
-                <a:cs typeface="Calibri"/>
-                <a:sym typeface="Calibri"/>
-              </a:rPr>
-              <a:t>Se </a:t>
-            </a:r>
-            <a:r>
-              <a:rPr lang="es-ES" dirty="0" err="1">
-                <a:latin typeface="Calibri"/>
-                <a:ea typeface="Calibri"/>
-                <a:cs typeface="Calibri"/>
-                <a:sym typeface="Calibri"/>
-              </a:rPr>
-              <a:t>utiliz</a:t>
-            </a:r>
-            <a:r>
-              <a:rPr lang="es-AR" dirty="0" err="1">
-                <a:latin typeface="Calibri"/>
-                <a:ea typeface="Calibri"/>
-                <a:cs typeface="Calibri"/>
-                <a:sym typeface="Calibri"/>
-              </a:rPr>
-              <a:t>ó</a:t>
-            </a:r>
-            <a:r>
-              <a:rPr lang="es-AR" dirty="0">
-                <a:latin typeface="Calibri"/>
-                <a:ea typeface="Calibri"/>
-                <a:cs typeface="Calibri"/>
-                <a:sym typeface="Calibri"/>
-              </a:rPr>
-              <a:t> una semilla durante la optimización bayesiana por una cuestión de tiempo.</a:t>
-            </a:r>
-            <a:endParaRPr dirty="0">
-              <a:latin typeface="Calibri"/>
-              <a:ea typeface="Calibri"/>
-              <a:cs typeface="Calibri"/>
-              <a:sym typeface="Calibri"/>
-            </a:endParaRPr>
-          </a:p>
-          <a:p>
-            <a:pPr marL="457200" lvl="0" indent="-342900" algn="l" rtl="0">
-              <a:spcBef>
-                <a:spcPts val="0"/>
-              </a:spcBef>
-              <a:spcAft>
-                <a:spcPts val="0"/>
-              </a:spcAft>
-              <a:buSzPts val="1800"/>
-              <a:buFont typeface="Calibri"/>
-              <a:buChar char="●"/>
-            </a:pPr>
-            <a:r>
-              <a:rPr lang="es-AR" dirty="0">
-                <a:latin typeface="Calibri"/>
-                <a:ea typeface="Calibri"/>
-                <a:cs typeface="Calibri"/>
-                <a:sym typeface="Calibri"/>
-              </a:rPr>
-              <a:t>Se utilizaron solo 50 iteraciones de optimización bayesiana.</a:t>
-            </a:r>
-            <a:endParaRPr dirty="0">
-              <a:latin typeface="Calibri"/>
-              <a:ea typeface="Calibri"/>
-              <a:cs typeface="Calibri"/>
-              <a:sym typeface="Calibri"/>
-            </a:endParaRPr>
-          </a:p>
-          <a:p>
-            <a:pPr marL="457200" lvl="0" indent="-342900" algn="l" rtl="0">
-              <a:spcBef>
-                <a:spcPts val="0"/>
-              </a:spcBef>
-              <a:spcAft>
-                <a:spcPts val="0"/>
-              </a:spcAft>
-              <a:buSzPts val="1800"/>
-              <a:buFont typeface="Calibri"/>
-              <a:buChar char="●"/>
-            </a:pPr>
-            <a:r>
-              <a:rPr lang="es-AR" dirty="0">
-                <a:latin typeface="Calibri"/>
-                <a:ea typeface="Calibri"/>
-                <a:cs typeface="Calibri"/>
-                <a:sym typeface="Calibri"/>
-              </a:rPr>
-              <a:t>La estrategia de entrenamiento utilizó un solo mes para entrenar y uno para probar, no hay garantía de que se extienda a otros diseños experimentales.</a:t>
-            </a:r>
-          </a:p>
-          <a:p>
-            <a:pPr marL="457200" lvl="0" indent="-342900" algn="l" rtl="0">
-              <a:spcBef>
-                <a:spcPts val="0"/>
-              </a:spcBef>
-              <a:spcAft>
-                <a:spcPts val="0"/>
-              </a:spcAft>
-              <a:buSzPts val="1800"/>
-              <a:buFont typeface="Calibri"/>
-              <a:buChar char="●"/>
-            </a:pPr>
-            <a:r>
-              <a:rPr lang="es-AR" dirty="0">
-                <a:latin typeface="Calibri"/>
-                <a:ea typeface="Calibri"/>
-                <a:cs typeface="Calibri"/>
-                <a:sym typeface="Calibri"/>
-              </a:rPr>
-              <a:t>No se estudian qué pasa con las combinaciones de </a:t>
-            </a:r>
-            <a:r>
-              <a:rPr lang="es-AR" dirty="0" err="1">
-                <a:latin typeface="Calibri"/>
-                <a:ea typeface="Calibri"/>
-                <a:cs typeface="Calibri"/>
-                <a:sym typeface="Calibri"/>
-              </a:rPr>
-              <a:t>features</a:t>
-            </a:r>
-            <a:r>
-              <a:rPr lang="es-AR" dirty="0">
-                <a:latin typeface="Calibri"/>
-                <a:ea typeface="Calibri"/>
-                <a:cs typeface="Calibri"/>
-                <a:sym typeface="Calibri"/>
-              </a:rPr>
-              <a:t> (por ejemplo, un </a:t>
-            </a:r>
-            <a:r>
-              <a:rPr lang="es-AR" dirty="0" err="1">
-                <a:latin typeface="Calibri"/>
-                <a:ea typeface="Calibri"/>
-                <a:cs typeface="Calibri"/>
-                <a:sym typeface="Calibri"/>
-              </a:rPr>
-              <a:t>dataset</a:t>
-            </a:r>
-            <a:r>
-              <a:rPr lang="es-AR" dirty="0">
-                <a:latin typeface="Calibri"/>
-                <a:ea typeface="Calibri"/>
-                <a:cs typeface="Calibri"/>
-                <a:sym typeface="Calibri"/>
-              </a:rPr>
-              <a:t> con las diferencias mes a mes y las aceleraciones). Puede haber cierta redundancia de información en estos casos por ser combinaciones lineales de valores de cada mes.</a:t>
-            </a:r>
-          </a:p>
-          <a:p>
-            <a:pPr marL="457200" lvl="0" indent="-342900" algn="l" rtl="0">
-              <a:spcBef>
-                <a:spcPts val="0"/>
-              </a:spcBef>
-              <a:spcAft>
-                <a:spcPts val="0"/>
-              </a:spcAft>
-              <a:buSzPts val="1800"/>
-              <a:buFont typeface="Calibri"/>
-              <a:buChar char="●"/>
-            </a:pPr>
-            <a:r>
-              <a:rPr lang="es-AR" dirty="0">
-                <a:latin typeface="Calibri"/>
-                <a:ea typeface="Calibri"/>
-                <a:cs typeface="Calibri"/>
-                <a:sym typeface="Calibri"/>
-              </a:rPr>
-              <a:t>Las conclusiones no necesariamente se extrapolan a otros </a:t>
-            </a:r>
-            <a:r>
-              <a:rPr lang="es-AR" dirty="0" err="1">
-                <a:latin typeface="Calibri"/>
-                <a:ea typeface="Calibri"/>
-                <a:cs typeface="Calibri"/>
-                <a:sym typeface="Calibri"/>
-              </a:rPr>
-              <a:t>datasets</a:t>
-            </a:r>
-            <a:r>
-              <a:rPr lang="es-AR" dirty="0">
-                <a:latin typeface="Calibri"/>
-                <a:ea typeface="Calibri"/>
-                <a:cs typeface="Calibri"/>
-                <a:sym typeface="Calibri"/>
-              </a:rPr>
-              <a:t>.</a:t>
-            </a:r>
-            <a:endParaRPr dirty="0">
-              <a:latin typeface="Calibri"/>
-              <a:ea typeface="Calibri"/>
-              <a:cs typeface="Calibri"/>
-              <a:sym typeface="Calibri"/>
-            </a:endParaRPr>
-          </a:p>
-          <a:p>
-            <a:pPr marL="0" lvl="0" indent="0" algn="l" rtl="0">
-              <a:spcBef>
-                <a:spcPts val="1200"/>
-              </a:spcBef>
-              <a:spcAft>
-                <a:spcPts val="1200"/>
-              </a:spcAft>
-              <a:buNone/>
-            </a:pPr>
-            <a:endParaRPr dirty="0"/>
-          </a:p>
-        </p:txBody>
-      </p:sp>
     </p:spTree>
   </p:cSld>
   <p:clrMapOvr>

</xml_diff>